<commit_message>
2016 10. heti előadásdiák feltöltése
</commit_message>
<xml_diff>
--- a/slideshows/grafreprezentacio.pptx
+++ b/slideshows/grafreprezentacio.pptx
@@ -5,7 +5,7 @@
     <p:sldMasterId id="2147483659" r:id="rId1"/>
   </p:sldMasterIdLst>
   <p:notesMasterIdLst>
-    <p:notesMasterId r:id="rId18"/>
+    <p:notesMasterId r:id="rId21"/>
   </p:notesMasterIdLst>
   <p:sldIdLst>
     <p:sldId id="256" r:id="rId2"/>
@@ -19,11 +19,14 @@
     <p:sldId id="264" r:id="rId10"/>
     <p:sldId id="265" r:id="rId11"/>
     <p:sldId id="266" r:id="rId12"/>
-    <p:sldId id="269" r:id="rId13"/>
-    <p:sldId id="270" r:id="rId14"/>
-    <p:sldId id="271" r:id="rId15"/>
-    <p:sldId id="272" r:id="rId16"/>
-    <p:sldId id="273" r:id="rId17"/>
+    <p:sldId id="274" r:id="rId13"/>
+    <p:sldId id="275" r:id="rId14"/>
+    <p:sldId id="276" r:id="rId15"/>
+    <p:sldId id="269" r:id="rId16"/>
+    <p:sldId id="270" r:id="rId17"/>
+    <p:sldId id="271" r:id="rId18"/>
+    <p:sldId id="272" r:id="rId19"/>
+    <p:sldId id="273" r:id="rId20"/>
   </p:sldIdLst>
   <p:sldSz cx="9144000" cy="5143500" type="screen16x9"/>
   <p:notesSz cx="6858000" cy="9144000"/>
@@ -231,7 +234,7 @@
   </p:defaultTextStyle>
   <p:extLst>
     <p:ext uri="{EFAFB233-063F-42B5-8137-9DF3F51BA10A}">
-      <p15:sldGuideLst xmlns:p15="http://schemas.microsoft.com/office/powerpoint/2012/main"/>
+      <p15:sldGuideLst xmlns:p15="http://schemas.microsoft.com/office/powerpoint/2012/main" xmlns=""/>
     </p:ext>
   </p:extLst>
 </p:presentation>
@@ -399,7 +402,7 @@
     </p:spTree>
     <p:extLst>
       <p:ext uri="{BB962C8B-B14F-4D97-AF65-F5344CB8AC3E}">
-        <p14:creationId xmlns:p14="http://schemas.microsoft.com/office/powerpoint/2010/main" val="4240770709"/>
+        <p14:creationId xmlns:p14="http://schemas.microsoft.com/office/powerpoint/2010/main" xmlns="" val="4240770709"/>
       </p:ext>
     </p:extLst>
   </p:cSld>
@@ -595,7 +598,7 @@
     </p:spTree>
     <p:extLst>
       <p:ext uri="{BB962C8B-B14F-4D97-AF65-F5344CB8AC3E}">
-        <p14:creationId xmlns:p14="http://schemas.microsoft.com/office/powerpoint/2010/main" val="4270500881"/>
+        <p14:creationId xmlns:p14="http://schemas.microsoft.com/office/powerpoint/2010/main" xmlns="" val="4270500881"/>
       </p:ext>
     </p:extLst>
   </p:cSld>
@@ -701,7 +704,7 @@
     </p:spTree>
     <p:extLst>
       <p:ext uri="{BB962C8B-B14F-4D97-AF65-F5344CB8AC3E}">
-        <p14:creationId xmlns:p14="http://schemas.microsoft.com/office/powerpoint/2010/main" val="1686389411"/>
+        <p14:creationId xmlns:p14="http://schemas.microsoft.com/office/powerpoint/2010/main" xmlns="" val="1686389411"/>
       </p:ext>
     </p:extLst>
   </p:cSld>
@@ -807,7 +810,7 @@
     </p:spTree>
     <p:extLst>
       <p:ext uri="{BB962C8B-B14F-4D97-AF65-F5344CB8AC3E}">
-        <p14:creationId xmlns:p14="http://schemas.microsoft.com/office/powerpoint/2010/main" val="2075670317"/>
+        <p14:creationId xmlns:p14="http://schemas.microsoft.com/office/powerpoint/2010/main" xmlns="" val="2075670317"/>
       </p:ext>
     </p:extLst>
   </p:cSld>
@@ -818,6 +821,218 @@
 </file>
 
 <file path=ppt/notesSlides/notesSlide12.xml><?xml version="1.0" encoding="utf-8"?>
+<p:notes xmlns:a="http://schemas.openxmlformats.org/drawingml/2006/main" xmlns:r="http://schemas.openxmlformats.org/officeDocument/2006/relationships" xmlns:p="http://schemas.openxmlformats.org/presentationml/2006/main" showMasterSp="0" showMasterPhAnim="0">
+  <p:cSld>
+    <p:spTree>
+      <p:nvGrpSpPr>
+        <p:cNvPr id="1" name="Shape 63"/>
+        <p:cNvGrpSpPr/>
+        <p:nvPr/>
+      </p:nvGrpSpPr>
+      <p:grpSpPr>
+        <a:xfrm>
+          <a:off x="0" y="0"/>
+          <a:ext cx="0" cy="0"/>
+          <a:chOff x="0" y="0"/>
+          <a:chExt cx="0" cy="0"/>
+        </a:xfrm>
+      </p:grpSpPr>
+      <p:sp>
+        <p:nvSpPr>
+          <p:cNvPr id="64" name="Shape 64"/>
+          <p:cNvSpPr>
+            <a:spLocks noGrp="1" noRot="1" noChangeAspect="1"/>
+          </p:cNvSpPr>
+          <p:nvPr>
+            <p:ph type="sldImg" idx="2"/>
+          </p:nvPr>
+        </p:nvSpPr>
+        <p:spPr>
+          <a:xfrm>
+            <a:off x="381000" y="685800"/>
+            <a:ext cx="6096000" cy="3429000"/>
+          </a:xfrm>
+          <a:custGeom>
+            <a:avLst/>
+            <a:gdLst/>
+            <a:ahLst/>
+            <a:cxnLst/>
+            <a:rect l="0" t="0" r="0" b="0"/>
+            <a:pathLst>
+              <a:path w="120000" h="120000" extrusionOk="0">
+                <a:moveTo>
+                  <a:pt x="0" y="0"/>
+                </a:moveTo>
+                <a:lnTo>
+                  <a:pt x="120000" y="0"/>
+                </a:lnTo>
+                <a:lnTo>
+                  <a:pt x="120000" y="120000"/>
+                </a:lnTo>
+                <a:lnTo>
+                  <a:pt x="0" y="120000"/>
+                </a:lnTo>
+                <a:close/>
+              </a:path>
+            </a:pathLst>
+          </a:custGeom>
+        </p:spPr>
+      </p:sp>
+      <p:sp>
+        <p:nvSpPr>
+          <p:cNvPr id="65" name="Shape 65"/>
+          <p:cNvSpPr txBox="1">
+            <a:spLocks noGrp="1"/>
+          </p:cNvSpPr>
+          <p:nvPr>
+            <p:ph type="body" idx="1"/>
+          </p:nvPr>
+        </p:nvSpPr>
+        <p:spPr>
+          <a:xfrm>
+            <a:off x="685800" y="4343400"/>
+            <a:ext cx="5486399" cy="4114800"/>
+          </a:xfrm>
+          <a:prstGeom prst="rect">
+            <a:avLst/>
+          </a:prstGeom>
+        </p:spPr>
+        <p:txBody>
+          <a:bodyPr lIns="91425" tIns="91425" rIns="91425" bIns="91425" anchor="t" anchorCtr="0">
+            <a:noAutofit/>
+          </a:bodyPr>
+          <a:lstStyle/>
+          <a:p>
+            <a:pPr lvl="0">
+              <a:spcBef>
+                <a:spcPts val="0"/>
+              </a:spcBef>
+              <a:buNone/>
+            </a:pPr>
+            <a:endParaRPr/>
+          </a:p>
+        </p:txBody>
+      </p:sp>
+    </p:spTree>
+    <p:extLst>
+      <p:ext uri="{BB962C8B-B14F-4D97-AF65-F5344CB8AC3E}">
+        <p14:creationId xmlns="" xmlns:p14="http://schemas.microsoft.com/office/powerpoint/2010/main" val="807925529"/>
+      </p:ext>
+    </p:extLst>
+  </p:cSld>
+  <p:clrMapOvr>
+    <a:masterClrMapping/>
+  </p:clrMapOvr>
+</p:notes>
+</file>
+
+<file path=ppt/notesSlides/notesSlide13.xml><?xml version="1.0" encoding="utf-8"?>
+<p:notes xmlns:a="http://schemas.openxmlformats.org/drawingml/2006/main" xmlns:r="http://schemas.openxmlformats.org/officeDocument/2006/relationships" xmlns:p="http://schemas.openxmlformats.org/presentationml/2006/main" showMasterSp="0" showMasterPhAnim="0">
+  <p:cSld>
+    <p:spTree>
+      <p:nvGrpSpPr>
+        <p:cNvPr id="1" name="Shape 69"/>
+        <p:cNvGrpSpPr/>
+        <p:nvPr/>
+      </p:nvGrpSpPr>
+      <p:grpSpPr>
+        <a:xfrm>
+          <a:off x="0" y="0"/>
+          <a:ext cx="0" cy="0"/>
+          <a:chOff x="0" y="0"/>
+          <a:chExt cx="0" cy="0"/>
+        </a:xfrm>
+      </p:grpSpPr>
+      <p:sp>
+        <p:nvSpPr>
+          <p:cNvPr id="70" name="Shape 70"/>
+          <p:cNvSpPr>
+            <a:spLocks noGrp="1" noRot="1" noChangeAspect="1"/>
+          </p:cNvSpPr>
+          <p:nvPr>
+            <p:ph type="sldImg" idx="2"/>
+          </p:nvPr>
+        </p:nvSpPr>
+        <p:spPr>
+          <a:xfrm>
+            <a:off x="381000" y="685800"/>
+            <a:ext cx="6096000" cy="3429000"/>
+          </a:xfrm>
+          <a:custGeom>
+            <a:avLst/>
+            <a:gdLst/>
+            <a:ahLst/>
+            <a:cxnLst/>
+            <a:rect l="0" t="0" r="0" b="0"/>
+            <a:pathLst>
+              <a:path w="120000" h="120000" extrusionOk="0">
+                <a:moveTo>
+                  <a:pt x="0" y="0"/>
+                </a:moveTo>
+                <a:lnTo>
+                  <a:pt x="120000" y="0"/>
+                </a:lnTo>
+                <a:lnTo>
+                  <a:pt x="120000" y="120000"/>
+                </a:lnTo>
+                <a:lnTo>
+                  <a:pt x="0" y="120000"/>
+                </a:lnTo>
+                <a:close/>
+              </a:path>
+            </a:pathLst>
+          </a:custGeom>
+        </p:spPr>
+      </p:sp>
+      <p:sp>
+        <p:nvSpPr>
+          <p:cNvPr id="71" name="Shape 71"/>
+          <p:cNvSpPr txBox="1">
+            <a:spLocks noGrp="1"/>
+          </p:cNvSpPr>
+          <p:nvPr>
+            <p:ph type="body" idx="1"/>
+          </p:nvPr>
+        </p:nvSpPr>
+        <p:spPr>
+          <a:xfrm>
+            <a:off x="685800" y="4343400"/>
+            <a:ext cx="5486399" cy="4114800"/>
+          </a:xfrm>
+          <a:prstGeom prst="rect">
+            <a:avLst/>
+          </a:prstGeom>
+        </p:spPr>
+        <p:txBody>
+          <a:bodyPr lIns="91425" tIns="91425" rIns="91425" bIns="91425" anchor="t" anchorCtr="0">
+            <a:noAutofit/>
+          </a:bodyPr>
+          <a:lstStyle/>
+          <a:p>
+            <a:pPr lvl="0">
+              <a:spcBef>
+                <a:spcPts val="0"/>
+              </a:spcBef>
+              <a:buNone/>
+            </a:pPr>
+            <a:endParaRPr/>
+          </a:p>
+        </p:txBody>
+      </p:sp>
+    </p:spTree>
+    <p:extLst>
+      <p:ext uri="{BB962C8B-B14F-4D97-AF65-F5344CB8AC3E}">
+        <p14:creationId xmlns="" xmlns:p14="http://schemas.microsoft.com/office/powerpoint/2010/main" val="1520075025"/>
+      </p:ext>
+    </p:extLst>
+  </p:cSld>
+  <p:clrMapOvr>
+    <a:masterClrMapping/>
+  </p:clrMapOvr>
+</p:notes>
+</file>
+
+<file path=ppt/notesSlides/notesSlide14.xml><?xml version="1.0" encoding="utf-8"?>
 <p:notes xmlns:a="http://schemas.openxmlformats.org/drawingml/2006/main" xmlns:r="http://schemas.openxmlformats.org/officeDocument/2006/relationships" xmlns:p="http://schemas.openxmlformats.org/presentationml/2006/main" showMasterSp="0" showMasterPhAnim="0">
   <p:cSld>
     <p:spTree>
@@ -917,7 +1132,7 @@
     </p:spTree>
     <p:extLst>
       <p:ext uri="{BB962C8B-B14F-4D97-AF65-F5344CB8AC3E}">
-        <p14:creationId xmlns:p14="http://schemas.microsoft.com/office/powerpoint/2010/main" val="307543425"/>
+        <p14:creationId xmlns:p14="http://schemas.microsoft.com/office/powerpoint/2010/main" xmlns="" val="307543425"/>
       </p:ext>
     </p:extLst>
   </p:cSld>
@@ -927,7 +1142,7 @@
 </p:notes>
 </file>
 
-<file path=ppt/notesSlides/notesSlide13.xml><?xml version="1.0" encoding="utf-8"?>
+<file path=ppt/notesSlides/notesSlide15.xml><?xml version="1.0" encoding="utf-8"?>
 <p:notes xmlns:a="http://schemas.openxmlformats.org/drawingml/2006/main" xmlns:r="http://schemas.openxmlformats.org/officeDocument/2006/relationships" xmlns:p="http://schemas.openxmlformats.org/presentationml/2006/main" showMasterSp="0" showMasterPhAnim="0">
   <p:cSld>
     <p:spTree>
@@ -1023,7 +1238,7 @@
     </p:spTree>
     <p:extLst>
       <p:ext uri="{BB962C8B-B14F-4D97-AF65-F5344CB8AC3E}">
-        <p14:creationId xmlns:p14="http://schemas.microsoft.com/office/powerpoint/2010/main" val="2357300524"/>
+        <p14:creationId xmlns:p14="http://schemas.microsoft.com/office/powerpoint/2010/main" xmlns="" val="2357300524"/>
       </p:ext>
     </p:extLst>
   </p:cSld>
@@ -1033,7 +1248,7 @@
 </p:notes>
 </file>
 
-<file path=ppt/notesSlides/notesSlide14.xml><?xml version="1.0" encoding="utf-8"?>
+<file path=ppt/notesSlides/notesSlide16.xml><?xml version="1.0" encoding="utf-8"?>
 <p:notes xmlns:a="http://schemas.openxmlformats.org/drawingml/2006/main" xmlns:r="http://schemas.openxmlformats.org/officeDocument/2006/relationships" xmlns:p="http://schemas.openxmlformats.org/presentationml/2006/main" showMasterSp="0" showMasterPhAnim="0">
   <p:cSld>
     <p:spTree>
@@ -1129,7 +1344,7 @@
     </p:spTree>
     <p:extLst>
       <p:ext uri="{BB962C8B-B14F-4D97-AF65-F5344CB8AC3E}">
-        <p14:creationId xmlns:p14="http://schemas.microsoft.com/office/powerpoint/2010/main" val="348659197"/>
+        <p14:creationId xmlns:p14="http://schemas.microsoft.com/office/powerpoint/2010/main" xmlns="" val="348659197"/>
       </p:ext>
     </p:extLst>
   </p:cSld>
@@ -1139,7 +1354,7 @@
 </p:notes>
 </file>
 
-<file path=ppt/notesSlides/notesSlide15.xml><?xml version="1.0" encoding="utf-8"?>
+<file path=ppt/notesSlides/notesSlide17.xml><?xml version="1.0" encoding="utf-8"?>
 <p:notes xmlns:a="http://schemas.openxmlformats.org/drawingml/2006/main" xmlns:r="http://schemas.openxmlformats.org/officeDocument/2006/relationships" xmlns:p="http://schemas.openxmlformats.org/presentationml/2006/main" showMasterSp="0" showMasterPhAnim="0">
   <p:cSld>
     <p:spTree>
@@ -1240,7 +1455,7 @@
     </p:spTree>
     <p:extLst>
       <p:ext uri="{BB962C8B-B14F-4D97-AF65-F5344CB8AC3E}">
-        <p14:creationId xmlns:p14="http://schemas.microsoft.com/office/powerpoint/2010/main" val="4135914698"/>
+        <p14:creationId xmlns:p14="http://schemas.microsoft.com/office/powerpoint/2010/main" xmlns="" val="4135914698"/>
       </p:ext>
     </p:extLst>
   </p:cSld>
@@ -1250,7 +1465,7 @@
 </p:notes>
 </file>
 
-<file path=ppt/notesSlides/notesSlide16.xml><?xml version="1.0" encoding="utf-8"?>
+<file path=ppt/notesSlides/notesSlide18.xml><?xml version="1.0" encoding="utf-8"?>
 <p:notes xmlns:a="http://schemas.openxmlformats.org/drawingml/2006/main" xmlns:r="http://schemas.openxmlformats.org/officeDocument/2006/relationships" xmlns:p="http://schemas.openxmlformats.org/presentationml/2006/main" showMasterSp="0" showMasterPhAnim="0">
   <p:cSld>
     <p:spTree>
@@ -1346,7 +1561,7 @@
     </p:spTree>
     <p:extLst>
       <p:ext uri="{BB962C8B-B14F-4D97-AF65-F5344CB8AC3E}">
-        <p14:creationId xmlns:p14="http://schemas.microsoft.com/office/powerpoint/2010/main" val="352379655"/>
+        <p14:creationId xmlns:p14="http://schemas.microsoft.com/office/powerpoint/2010/main" xmlns="" val="352379655"/>
       </p:ext>
     </p:extLst>
   </p:cSld>
@@ -1452,7 +1667,7 @@
     </p:spTree>
     <p:extLst>
       <p:ext uri="{BB962C8B-B14F-4D97-AF65-F5344CB8AC3E}">
-        <p14:creationId xmlns:p14="http://schemas.microsoft.com/office/powerpoint/2010/main" val="1199249993"/>
+        <p14:creationId xmlns:p14="http://schemas.microsoft.com/office/powerpoint/2010/main" xmlns="" val="1199249993"/>
       </p:ext>
     </p:extLst>
   </p:cSld>
@@ -1567,7 +1782,7 @@
     </p:spTree>
     <p:extLst>
       <p:ext uri="{BB962C8B-B14F-4D97-AF65-F5344CB8AC3E}">
-        <p14:creationId xmlns:p14="http://schemas.microsoft.com/office/powerpoint/2010/main" val="1634581459"/>
+        <p14:creationId xmlns:p14="http://schemas.microsoft.com/office/powerpoint/2010/main" xmlns="" val="1634581459"/>
       </p:ext>
     </p:extLst>
   </p:cSld>
@@ -1673,7 +1888,7 @@
     </p:spTree>
     <p:extLst>
       <p:ext uri="{BB962C8B-B14F-4D97-AF65-F5344CB8AC3E}">
-        <p14:creationId xmlns:p14="http://schemas.microsoft.com/office/powerpoint/2010/main" val="3568601046"/>
+        <p14:creationId xmlns:p14="http://schemas.microsoft.com/office/powerpoint/2010/main" xmlns="" val="3568601046"/>
       </p:ext>
     </p:extLst>
   </p:cSld>
@@ -1779,7 +1994,7 @@
     </p:spTree>
     <p:extLst>
       <p:ext uri="{BB962C8B-B14F-4D97-AF65-F5344CB8AC3E}">
-        <p14:creationId xmlns:p14="http://schemas.microsoft.com/office/powerpoint/2010/main" val="784043581"/>
+        <p14:creationId xmlns:p14="http://schemas.microsoft.com/office/powerpoint/2010/main" xmlns="" val="784043581"/>
       </p:ext>
     </p:extLst>
   </p:cSld>
@@ -1885,7 +2100,7 @@
     </p:spTree>
     <p:extLst>
       <p:ext uri="{BB962C8B-B14F-4D97-AF65-F5344CB8AC3E}">
-        <p14:creationId xmlns:p14="http://schemas.microsoft.com/office/powerpoint/2010/main" val="1751283784"/>
+        <p14:creationId xmlns:p14="http://schemas.microsoft.com/office/powerpoint/2010/main" xmlns="" val="1751283784"/>
       </p:ext>
     </p:extLst>
   </p:cSld>
@@ -1991,7 +2206,7 @@
     </p:spTree>
     <p:extLst>
       <p:ext uri="{BB962C8B-B14F-4D97-AF65-F5344CB8AC3E}">
-        <p14:creationId xmlns:p14="http://schemas.microsoft.com/office/powerpoint/2010/main" val="3994330825"/>
+        <p14:creationId xmlns:p14="http://schemas.microsoft.com/office/powerpoint/2010/main" xmlns="" val="3994330825"/>
       </p:ext>
     </p:extLst>
   </p:cSld>
@@ -2097,7 +2312,7 @@
     </p:spTree>
     <p:extLst>
       <p:ext uri="{BB962C8B-B14F-4D97-AF65-F5344CB8AC3E}">
-        <p14:creationId xmlns:p14="http://schemas.microsoft.com/office/powerpoint/2010/main" val="2008840253"/>
+        <p14:creationId xmlns:p14="http://schemas.microsoft.com/office/powerpoint/2010/main" xmlns="" val="2008840253"/>
       </p:ext>
     </p:extLst>
   </p:cSld>
@@ -2203,7 +2418,7 @@
     </p:spTree>
     <p:extLst>
       <p:ext uri="{BB962C8B-B14F-4D97-AF65-F5344CB8AC3E}">
-        <p14:creationId xmlns:p14="http://schemas.microsoft.com/office/powerpoint/2010/main" val="2359467975"/>
+        <p14:creationId xmlns:p14="http://schemas.microsoft.com/office/powerpoint/2010/main" xmlns="" val="2359467975"/>
       </p:ext>
     </p:extLst>
   </p:cSld>
@@ -2508,6 +2723,12 @@
             </a:pPr>
             <a:fld id="{00000000-1234-1234-1234-123412341234}" type="slidenum">
               <a:rPr lang="en"/>
+              <a:pPr lvl="0">
+                <a:spcBef>
+                  <a:spcPts val="0"/>
+                </a:spcBef>
+                <a:buNone/>
+              </a:pPr>
               <a:t>‹#›</a:t>
             </a:fld>
             <a:endParaRPr lang="en"/>
@@ -2745,6 +2966,12 @@
             </a:pPr>
             <a:fld id="{00000000-1234-1234-1234-123412341234}" type="slidenum">
               <a:rPr lang="en"/>
+              <a:pPr lvl="0">
+                <a:spcBef>
+                  <a:spcPts val="0"/>
+                </a:spcBef>
+                <a:buNone/>
+              </a:pPr>
               <a:t>‹#›</a:t>
             </a:fld>
             <a:endParaRPr lang="en"/>
@@ -2809,6 +3036,12 @@
             </a:pPr>
             <a:fld id="{00000000-1234-1234-1234-123412341234}" type="slidenum">
               <a:rPr lang="en"/>
+              <a:pPr lvl="0">
+                <a:spcBef>
+                  <a:spcPts val="0"/>
+                </a:spcBef>
+                <a:buNone/>
+              </a:pPr>
               <a:t>‹#›</a:t>
             </a:fld>
             <a:endParaRPr lang="en"/>
@@ -2964,6 +3197,12 @@
             </a:pPr>
             <a:fld id="{00000000-1234-1234-1234-123412341234}" type="slidenum">
               <a:rPr lang="en"/>
+              <a:pPr lvl="0">
+                <a:spcBef>
+                  <a:spcPts val="0"/>
+                </a:spcBef>
+                <a:buNone/>
+              </a:pPr>
               <a:t>‹#›</a:t>
             </a:fld>
             <a:endParaRPr lang="en"/>
@@ -3192,6 +3431,12 @@
             </a:pPr>
             <a:fld id="{00000000-1234-1234-1234-123412341234}" type="slidenum">
               <a:rPr lang="en"/>
+              <a:pPr lvl="0">
+                <a:spcBef>
+                  <a:spcPts val="0"/>
+                </a:spcBef>
+                <a:buNone/>
+              </a:pPr>
               <a:t>‹#›</a:t>
             </a:fld>
             <a:endParaRPr lang="en"/>
@@ -3520,6 +3765,12 @@
             </a:pPr>
             <a:fld id="{00000000-1234-1234-1234-123412341234}" type="slidenum">
               <a:rPr lang="en"/>
+              <a:pPr lvl="0">
+                <a:spcBef>
+                  <a:spcPts val="0"/>
+                </a:spcBef>
+                <a:buNone/>
+              </a:pPr>
               <a:t>‹#›</a:t>
             </a:fld>
             <a:endParaRPr lang="en"/>
@@ -3666,6 +3917,12 @@
             </a:pPr>
             <a:fld id="{00000000-1234-1234-1234-123412341234}" type="slidenum">
               <a:rPr lang="en"/>
+              <a:pPr lvl="0">
+                <a:spcBef>
+                  <a:spcPts val="0"/>
+                </a:spcBef>
+                <a:buNone/>
+              </a:pPr>
               <a:t>‹#›</a:t>
             </a:fld>
             <a:endParaRPr lang="en"/>
@@ -3912,6 +4169,12 @@
             </a:pPr>
             <a:fld id="{00000000-1234-1234-1234-123412341234}" type="slidenum">
               <a:rPr lang="en"/>
+              <a:pPr lvl="0">
+                <a:spcBef>
+                  <a:spcPts val="0"/>
+                </a:spcBef>
+                <a:buNone/>
+              </a:pPr>
               <a:t>‹#›</a:t>
             </a:fld>
             <a:endParaRPr lang="en"/>
@@ -4067,6 +4330,12 @@
             </a:pPr>
             <a:fld id="{00000000-1234-1234-1234-123412341234}" type="slidenum">
               <a:rPr lang="en"/>
+              <a:pPr lvl="0">
+                <a:spcBef>
+                  <a:spcPts val="0"/>
+                </a:spcBef>
+                <a:buNone/>
+              </a:pPr>
               <a:t>‹#›</a:t>
             </a:fld>
             <a:endParaRPr lang="en"/>
@@ -4495,6 +4764,12 @@
             </a:pPr>
             <a:fld id="{00000000-1234-1234-1234-123412341234}" type="slidenum">
               <a:rPr lang="en"/>
+              <a:pPr lvl="0">
+                <a:spcBef>
+                  <a:spcPts val="0"/>
+                </a:spcBef>
+                <a:buNone/>
+              </a:pPr>
               <a:t>‹#›</a:t>
             </a:fld>
             <a:endParaRPr lang="en"/>
@@ -4600,6 +4875,12 @@
             </a:pPr>
             <a:fld id="{00000000-1234-1234-1234-123412341234}" type="slidenum">
               <a:rPr lang="en"/>
+              <a:pPr lvl="0">
+                <a:spcBef>
+                  <a:spcPts val="0"/>
+                </a:spcBef>
+                <a:buNone/>
+              </a:pPr>
               <a:t>‹#›</a:t>
             </a:fld>
             <a:endParaRPr lang="en"/>
@@ -5051,6 +5332,12 @@
                   <a:schemeClr val="dk2"/>
                 </a:solidFill>
               </a:rPr>
+              <a:pPr lvl="0" algn="r">
+                <a:spcBef>
+                  <a:spcPts val="0"/>
+                </a:spcBef>
+                <a:buNone/>
+              </a:pPr>
               <a:t>‹#›</a:t>
             </a:fld>
             <a:endParaRPr lang="en" sz="1000">
@@ -6187,6 +6474,1297 @@
   <p:cSld>
     <p:spTree>
       <p:nvGrpSpPr>
+        <p:cNvPr id="1" name="Shape 66"/>
+        <p:cNvGrpSpPr/>
+        <p:nvPr/>
+      </p:nvGrpSpPr>
+      <p:grpSpPr>
+        <a:xfrm>
+          <a:off x="0" y="0"/>
+          <a:ext cx="0" cy="0"/>
+          <a:chOff x="0" y="0"/>
+          <a:chExt cx="0" cy="0"/>
+        </a:xfrm>
+      </p:grpSpPr>
+      <p:sp>
+        <p:nvSpPr>
+          <p:cNvPr id="67" name="Shape 67"/>
+          <p:cNvSpPr txBox="1">
+            <a:spLocks noGrp="1"/>
+          </p:cNvSpPr>
+          <p:nvPr>
+            <p:ph type="title"/>
+          </p:nvPr>
+        </p:nvSpPr>
+        <p:spPr>
+          <a:xfrm>
+            <a:off x="311700" y="0"/>
+            <a:ext cx="8520600" cy="572700"/>
+          </a:xfrm>
+          <a:prstGeom prst="rect">
+            <a:avLst/>
+          </a:prstGeom>
+        </p:spPr>
+        <p:txBody>
+          <a:bodyPr lIns="91425" tIns="91425" rIns="91425" bIns="91425" anchor="t" anchorCtr="0">
+            <a:noAutofit/>
+          </a:bodyPr>
+          <a:lstStyle/>
+          <a:p>
+            <a:pPr lvl="0" algn="ctr">
+              <a:spcBef>
+                <a:spcPts val="0"/>
+              </a:spcBef>
+              <a:buNone/>
+            </a:pPr>
+            <a:r>
+              <a:rPr lang="en" dirty="0"/>
+              <a:t>Osztályokra vonatkozó tanácsok</a:t>
+            </a:r>
+          </a:p>
+        </p:txBody>
+      </p:sp>
+      <p:sp>
+        <p:nvSpPr>
+          <p:cNvPr id="68" name="Shape 68"/>
+          <p:cNvSpPr txBox="1">
+            <a:spLocks noGrp="1"/>
+          </p:cNvSpPr>
+          <p:nvPr>
+            <p:ph type="body" idx="1"/>
+          </p:nvPr>
+        </p:nvSpPr>
+        <p:spPr>
+          <a:xfrm>
+            <a:off x="311700" y="572700"/>
+            <a:ext cx="8520600" cy="4570800"/>
+          </a:xfrm>
+          <a:prstGeom prst="rect">
+            <a:avLst/>
+          </a:prstGeom>
+        </p:spPr>
+        <p:txBody>
+          <a:bodyPr lIns="91425" tIns="91425" rIns="91425" bIns="91425" anchor="ctr" anchorCtr="0">
+            <a:noAutofit/>
+          </a:bodyPr>
+          <a:lstStyle/>
+          <a:p>
+            <a:pPr marL="457200" lvl="0" indent="-355600" rtl="0">
+              <a:lnSpc>
+                <a:spcPct val="100000"/>
+              </a:lnSpc>
+              <a:spcBef>
+                <a:spcPts val="0"/>
+              </a:spcBef>
+              <a:spcAft>
+                <a:spcPts val="0"/>
+              </a:spcAft>
+              <a:buClr>
+                <a:srgbClr val="000000"/>
+              </a:buClr>
+              <a:buSzPct val="100000"/>
+              <a:buFont typeface="Arial" panose="020B0604020202020204" pitchFamily="34" charset="0"/>
+              <a:buChar char="•"/>
+            </a:pPr>
+            <a:r>
+              <a:rPr lang="hu-HU" sz="2000" b="1" dirty="0" smtClean="0">
+                <a:solidFill>
+                  <a:srgbClr val="000000"/>
+                </a:solidFill>
+              </a:rPr>
+              <a:t>Single responsiblity: </a:t>
+            </a:r>
+            <a:r>
+              <a:rPr lang="en" sz="2000" dirty="0" smtClean="0">
+                <a:solidFill>
+                  <a:srgbClr val="000000"/>
+                </a:solidFill>
+              </a:rPr>
+              <a:t>egyetlen,jól </a:t>
+            </a:r>
+            <a:r>
+              <a:rPr lang="en" sz="2000" dirty="0">
+                <a:solidFill>
+                  <a:srgbClr val="000000"/>
+                </a:solidFill>
+              </a:rPr>
+              <a:t>szeparálható feladatkörre, funkcióra </a:t>
+            </a:r>
+            <a:r>
+              <a:rPr lang="en" sz="2000" dirty="0" smtClean="0">
+                <a:solidFill>
+                  <a:srgbClr val="000000"/>
+                </a:solidFill>
+              </a:rPr>
+              <a:t>összpontosító</a:t>
+            </a:r>
+            <a:r>
+              <a:rPr lang="hu-HU" sz="2000" dirty="0" smtClean="0">
+                <a:solidFill>
+                  <a:srgbClr val="000000"/>
+                </a:solidFill>
+              </a:rPr>
+              <a:t> </a:t>
+            </a:r>
+            <a:r>
+              <a:rPr lang="en" sz="2000" dirty="0" smtClean="0">
+                <a:solidFill>
+                  <a:srgbClr val="000000"/>
+                </a:solidFill>
+              </a:rPr>
+              <a:t>osztályok</a:t>
+            </a:r>
+            <a:endParaRPr lang="hu-HU" sz="2000" dirty="0" smtClean="0">
+              <a:solidFill>
+                <a:srgbClr val="000000"/>
+              </a:solidFill>
+            </a:endParaRPr>
+          </a:p>
+          <a:p>
+            <a:pPr marL="457200" lvl="0" indent="-355600" rtl="0">
+              <a:lnSpc>
+                <a:spcPct val="100000"/>
+              </a:lnSpc>
+              <a:spcBef>
+                <a:spcPts val="0"/>
+              </a:spcBef>
+              <a:spcAft>
+                <a:spcPts val="0"/>
+              </a:spcAft>
+              <a:buClr>
+                <a:srgbClr val="000000"/>
+              </a:buClr>
+              <a:buSzPct val="100000"/>
+              <a:buFont typeface="Arial" panose="020B0604020202020204" pitchFamily="34" charset="0"/>
+              <a:buChar char="•"/>
+            </a:pPr>
+            <a:r>
+              <a:rPr lang="hu-HU" sz="2000" b="1" dirty="0" smtClean="0">
+                <a:solidFill>
+                  <a:srgbClr val="000000"/>
+                </a:solidFill>
+              </a:rPr>
+              <a:t>„for the sake of DRYness”:</a:t>
+            </a:r>
+            <a:r>
+              <a:rPr lang="hu-HU" sz="2000" dirty="0" smtClean="0">
+                <a:solidFill>
+                  <a:srgbClr val="000000"/>
+                </a:solidFill>
+              </a:rPr>
+              <a:t> </a:t>
+            </a:r>
+            <a:r>
+              <a:rPr lang="en" sz="2000" dirty="0" smtClean="0">
+                <a:solidFill>
+                  <a:srgbClr val="000000"/>
+                </a:solidFill>
+              </a:rPr>
+              <a:t>modularitás</a:t>
+            </a:r>
+            <a:r>
+              <a:rPr lang="en" sz="2000" dirty="0">
+                <a:solidFill>
+                  <a:srgbClr val="000000"/>
+                </a:solidFill>
+              </a:rPr>
+              <a:t>, </a:t>
+            </a:r>
+            <a:r>
+              <a:rPr lang="en" sz="2000" dirty="0" smtClean="0">
+                <a:solidFill>
+                  <a:srgbClr val="000000"/>
+                </a:solidFill>
+              </a:rPr>
+              <a:t>újrafelhasználhatóság</a:t>
+            </a:r>
+            <a:endParaRPr lang="en" sz="2000" dirty="0">
+              <a:solidFill>
+                <a:srgbClr val="000000"/>
+              </a:solidFill>
+            </a:endParaRPr>
+          </a:p>
+          <a:p>
+            <a:pPr marL="457200" lvl="0" indent="-355600" rtl="0">
+              <a:lnSpc>
+                <a:spcPct val="100000"/>
+              </a:lnSpc>
+              <a:spcBef>
+                <a:spcPts val="0"/>
+              </a:spcBef>
+              <a:spcAft>
+                <a:spcPts val="0"/>
+              </a:spcAft>
+              <a:buClr>
+                <a:schemeClr val="dk1"/>
+              </a:buClr>
+              <a:buSzPct val="100000"/>
+              <a:buFont typeface="Arial" panose="020B0604020202020204" pitchFamily="34" charset="0"/>
+              <a:buChar char="•"/>
+            </a:pPr>
+            <a:r>
+              <a:rPr lang="en" sz="2000" dirty="0">
+                <a:solidFill>
+                  <a:schemeClr val="dk1"/>
+                </a:solidFill>
+              </a:rPr>
+              <a:t>osztályváltozó, vagy paraméter?: </a:t>
+            </a:r>
+            <a:endParaRPr lang="hu-HU" sz="2000" dirty="0" smtClean="0">
+              <a:solidFill>
+                <a:schemeClr val="dk1"/>
+              </a:solidFill>
+            </a:endParaRPr>
+          </a:p>
+          <a:p>
+            <a:pPr marL="101600">
+              <a:lnSpc>
+                <a:spcPct val="100000"/>
+              </a:lnSpc>
+              <a:spcAft>
+                <a:spcPts val="0"/>
+              </a:spcAft>
+              <a:buClr>
+                <a:schemeClr val="dk1"/>
+              </a:buClr>
+            </a:pPr>
+            <a:r>
+              <a:rPr lang="hu-HU" sz="2000" dirty="0" smtClean="0">
+                <a:solidFill>
+                  <a:schemeClr val="dk1"/>
+                </a:solidFill>
+              </a:rPr>
+              <a:t>      a.  </a:t>
+            </a:r>
+            <a:r>
+              <a:rPr lang="en" sz="2000" dirty="0" smtClean="0">
+                <a:solidFill>
+                  <a:schemeClr val="dk1"/>
+                </a:solidFill>
+              </a:rPr>
+              <a:t>ha </a:t>
+            </a:r>
+            <a:r>
+              <a:rPr lang="en" sz="2000" dirty="0">
+                <a:solidFill>
+                  <a:schemeClr val="dk1"/>
+                </a:solidFill>
+              </a:rPr>
+              <a:t>több helyen van függvényben használva, érdemes az </a:t>
+            </a:r>
+            <a:r>
+              <a:rPr lang="en" sz="2000" dirty="0" smtClean="0">
+                <a:solidFill>
+                  <a:schemeClr val="dk1"/>
+                </a:solidFill>
+              </a:rPr>
+              <a:t>osztályváltozó</a:t>
+            </a:r>
+            <a:endParaRPr lang="hu-HU" sz="2000" dirty="0" smtClean="0">
+              <a:solidFill>
+                <a:schemeClr val="dk1"/>
+              </a:solidFill>
+            </a:endParaRPr>
+          </a:p>
+          <a:p>
+            <a:pPr marL="101600">
+              <a:lnSpc>
+                <a:spcPct val="100000"/>
+              </a:lnSpc>
+              <a:spcAft>
+                <a:spcPts val="0"/>
+              </a:spcAft>
+              <a:buClr>
+                <a:schemeClr val="dk1"/>
+              </a:buClr>
+            </a:pPr>
+            <a:r>
+              <a:rPr lang="hu-HU" sz="2000" dirty="0" smtClean="0">
+                <a:solidFill>
+                  <a:schemeClr val="dk1"/>
+                </a:solidFill>
+              </a:rPr>
+              <a:t>      b.  Immutable objektumok (értékük nem fog változni)</a:t>
+            </a:r>
+          </a:p>
+          <a:p>
+            <a:pPr marL="101600">
+              <a:lnSpc>
+                <a:spcPct val="100000"/>
+              </a:lnSpc>
+              <a:spcAft>
+                <a:spcPts val="0"/>
+              </a:spcAft>
+              <a:buClr>
+                <a:schemeClr val="dk1"/>
+              </a:buClr>
+            </a:pPr>
+            <a:r>
+              <a:rPr lang="hu-HU" sz="2000" dirty="0">
+                <a:solidFill>
+                  <a:schemeClr val="dk1"/>
+                </a:solidFill>
+              </a:rPr>
+              <a:t> </a:t>
+            </a:r>
+            <a:r>
+              <a:rPr lang="hu-HU" sz="2000" dirty="0" smtClean="0">
+                <a:solidFill>
+                  <a:schemeClr val="dk1"/>
+                </a:solidFill>
+              </a:rPr>
+              <a:t>     c.  Belső változóink (classfileds) védelme (private láthatóságú +getter hozzá)</a:t>
+            </a:r>
+            <a:endParaRPr lang="en" sz="2000" dirty="0">
+              <a:solidFill>
+                <a:schemeClr val="dk1"/>
+              </a:solidFill>
+            </a:endParaRPr>
+          </a:p>
+          <a:p>
+            <a:pPr marL="457200" lvl="0" indent="-355600" rtl="0">
+              <a:lnSpc>
+                <a:spcPct val="100000"/>
+              </a:lnSpc>
+              <a:spcBef>
+                <a:spcPts val="0"/>
+              </a:spcBef>
+              <a:spcAft>
+                <a:spcPts val="0"/>
+              </a:spcAft>
+              <a:buClr>
+                <a:schemeClr val="dk1"/>
+              </a:buClr>
+              <a:buSzPct val="100000"/>
+              <a:buFont typeface="Arial" panose="020B0604020202020204" pitchFamily="34" charset="0"/>
+              <a:buChar char="•"/>
+            </a:pPr>
+            <a:r>
+              <a:rPr lang="hu-HU" sz="2000" dirty="0">
+                <a:solidFill>
+                  <a:schemeClr val="dk1"/>
+                </a:solidFill>
+              </a:rPr>
+              <a:t>K</a:t>
+            </a:r>
+            <a:r>
+              <a:rPr lang="en" sz="2000" dirty="0" smtClean="0">
+                <a:solidFill>
+                  <a:schemeClr val="dk1"/>
+                </a:solidFill>
+              </a:rPr>
+              <a:t>onstruktor </a:t>
+            </a:r>
+            <a:endParaRPr lang="en" sz="2000" dirty="0">
+              <a:solidFill>
+                <a:schemeClr val="dk1"/>
+              </a:solidFill>
+            </a:endParaRPr>
+          </a:p>
+          <a:p>
+            <a:pPr marL="914400" lvl="1" indent="-355600" rtl="0">
+              <a:lnSpc>
+                <a:spcPct val="100000"/>
+              </a:lnSpc>
+              <a:spcBef>
+                <a:spcPts val="0"/>
+              </a:spcBef>
+              <a:spcAft>
+                <a:spcPts val="0"/>
+              </a:spcAft>
+              <a:buClr>
+                <a:schemeClr val="dk1"/>
+              </a:buClr>
+              <a:buSzPct val="100000"/>
+              <a:buAutoNum type="alphaLcPeriod"/>
+            </a:pPr>
+            <a:r>
+              <a:rPr lang="en" sz="2000" dirty="0">
+                <a:solidFill>
+                  <a:schemeClr val="dk1"/>
+                </a:solidFill>
+              </a:rPr>
+              <a:t>ha nincs </a:t>
+            </a:r>
+            <a:r>
+              <a:rPr lang="hu-HU" sz="2000" dirty="0" smtClean="0">
+                <a:solidFill>
+                  <a:schemeClr val="dk1"/>
+                </a:solidFill>
+              </a:rPr>
+              <a:t>meg</a:t>
+            </a:r>
+            <a:r>
+              <a:rPr lang="en" sz="2000" dirty="0" smtClean="0">
+                <a:solidFill>
+                  <a:schemeClr val="dk1"/>
+                </a:solidFill>
+              </a:rPr>
+              <a:t>írva</a:t>
+            </a:r>
+            <a:r>
+              <a:rPr lang="en" sz="2000" dirty="0">
+                <a:solidFill>
+                  <a:schemeClr val="dk1"/>
+                </a:solidFill>
+              </a:rPr>
+              <a:t>, akkor is </a:t>
+            </a:r>
+            <a:r>
+              <a:rPr lang="en" sz="2000" dirty="0" smtClean="0">
+                <a:solidFill>
+                  <a:schemeClr val="dk1"/>
+                </a:solidFill>
+              </a:rPr>
+              <a:t>generál</a:t>
+            </a:r>
+            <a:r>
+              <a:rPr lang="hu-HU" sz="2000" dirty="0" smtClean="0">
+                <a:solidFill>
+                  <a:schemeClr val="dk1"/>
+                </a:solidFill>
+              </a:rPr>
+              <a:t>ó</a:t>
+            </a:r>
+            <a:r>
+              <a:rPr lang="en" sz="2000" dirty="0" smtClean="0">
+                <a:solidFill>
+                  <a:schemeClr val="dk1"/>
+                </a:solidFill>
+              </a:rPr>
+              <a:t>dik default</a:t>
+            </a:r>
+            <a:endParaRPr lang="en" sz="2000" dirty="0">
+              <a:solidFill>
+                <a:schemeClr val="dk1"/>
+              </a:solidFill>
+            </a:endParaRPr>
+          </a:p>
+          <a:p>
+            <a:pPr marL="914400" lvl="1" indent="-355600" rtl="0">
+              <a:lnSpc>
+                <a:spcPct val="100000"/>
+              </a:lnSpc>
+              <a:spcBef>
+                <a:spcPts val="0"/>
+              </a:spcBef>
+              <a:spcAft>
+                <a:spcPts val="0"/>
+              </a:spcAft>
+              <a:buClr>
+                <a:schemeClr val="dk1"/>
+              </a:buClr>
+              <a:buSzPct val="100000"/>
+              <a:buAutoNum type="alphaLcPeriod"/>
+            </a:pPr>
+            <a:r>
+              <a:rPr lang="en" sz="2000" dirty="0">
+                <a:solidFill>
+                  <a:schemeClr val="dk1"/>
+                </a:solidFill>
+              </a:rPr>
+              <a:t>a többféleképpen definiált </a:t>
+            </a:r>
+            <a:r>
+              <a:rPr lang="en" sz="2000" dirty="0" smtClean="0">
+                <a:solidFill>
+                  <a:schemeClr val="dk1"/>
+                </a:solidFill>
+              </a:rPr>
+              <a:t>szükséges-e?</a:t>
+            </a:r>
+            <a:r>
+              <a:rPr lang="hu-HU" sz="2000" dirty="0" smtClean="0">
+                <a:solidFill>
+                  <a:schemeClr val="dk1"/>
+                </a:solidFill>
+              </a:rPr>
+              <a:t> (overloading= túlterhelés típus alapján)</a:t>
+            </a:r>
+            <a:endParaRPr lang="en" sz="2000" dirty="0">
+              <a:solidFill>
+                <a:schemeClr val="dk1"/>
+              </a:solidFill>
+            </a:endParaRPr>
+          </a:p>
+          <a:p>
+            <a:pPr marL="914400" lvl="1" indent="-355600" rtl="0">
+              <a:lnSpc>
+                <a:spcPct val="100000"/>
+              </a:lnSpc>
+              <a:spcBef>
+                <a:spcPts val="0"/>
+              </a:spcBef>
+              <a:spcAft>
+                <a:spcPts val="0"/>
+              </a:spcAft>
+              <a:buClr>
+                <a:schemeClr val="dk1"/>
+              </a:buClr>
+              <a:buSzPct val="100000"/>
+              <a:buAutoNum type="alphaLcPeriod"/>
+            </a:pPr>
+            <a:r>
+              <a:rPr lang="en" sz="2000" dirty="0">
+                <a:solidFill>
+                  <a:schemeClr val="dk1"/>
+                </a:solidFill>
+              </a:rPr>
+              <a:t>super </a:t>
+            </a:r>
+            <a:r>
+              <a:rPr lang="en" sz="2000" dirty="0" smtClean="0">
+                <a:solidFill>
+                  <a:schemeClr val="dk1"/>
+                </a:solidFill>
+              </a:rPr>
+              <a:t>hívás</a:t>
+            </a:r>
+            <a:r>
+              <a:rPr lang="hu-HU" sz="2000" smtClean="0">
+                <a:solidFill>
+                  <a:schemeClr val="dk1"/>
+                </a:solidFill>
+              </a:rPr>
+              <a:t>a</a:t>
+            </a:r>
+            <a:endParaRPr lang="hu-HU" sz="2000" dirty="0" smtClean="0">
+              <a:solidFill>
+                <a:schemeClr val="dk1"/>
+              </a:solidFill>
+            </a:endParaRPr>
+          </a:p>
+        </p:txBody>
+      </p:sp>
+    </p:spTree>
+  </p:cSld>
+  <p:clrMapOvr>
+    <a:masterClrMapping/>
+  </p:clrMapOvr>
+  <p:transition spd="slow">
+    <p:cut/>
+  </p:transition>
+</p:sld>
+</file>
+
+<file path=ppt/slides/slide13.xml><?xml version="1.0" encoding="utf-8"?>
+<p:sld xmlns:a="http://schemas.openxmlformats.org/drawingml/2006/main" xmlns:r="http://schemas.openxmlformats.org/officeDocument/2006/relationships" xmlns:p="http://schemas.openxmlformats.org/presentationml/2006/main">
+  <p:cSld>
+    <p:spTree>
+      <p:nvGrpSpPr>
+        <p:cNvPr id="1" name=""/>
+        <p:cNvGrpSpPr/>
+        <p:nvPr/>
+      </p:nvGrpSpPr>
+      <p:grpSpPr>
+        <a:xfrm>
+          <a:off x="0" y="0"/>
+          <a:ext cx="0" cy="0"/>
+          <a:chOff x="0" y="0"/>
+          <a:chExt cx="0" cy="0"/>
+        </a:xfrm>
+      </p:grpSpPr>
+      <p:sp>
+        <p:nvSpPr>
+          <p:cNvPr id="2" name="Title 1"/>
+          <p:cNvSpPr>
+            <a:spLocks noGrp="1"/>
+          </p:cNvSpPr>
+          <p:nvPr>
+            <p:ph type="title"/>
+          </p:nvPr>
+        </p:nvSpPr>
+        <p:spPr/>
+        <p:txBody>
+          <a:bodyPr/>
+          <a:lstStyle/>
+          <a:p>
+            <a:pPr algn="ctr"/>
+            <a:r>
+              <a:rPr lang="en" dirty="0"/>
+              <a:t>Osztályokra vonatkozó tanácsok</a:t>
+            </a:r>
+            <a:endParaRPr lang="hu-HU" dirty="0"/>
+          </a:p>
+        </p:txBody>
+      </p:sp>
+      <p:sp>
+        <p:nvSpPr>
+          <p:cNvPr id="3" name="Text Placeholder 2"/>
+          <p:cNvSpPr>
+            <a:spLocks noGrp="1"/>
+          </p:cNvSpPr>
+          <p:nvPr>
+            <p:ph type="body" idx="1"/>
+          </p:nvPr>
+        </p:nvSpPr>
+        <p:spPr/>
+        <p:txBody>
+          <a:bodyPr/>
+          <a:lstStyle/>
+          <a:p>
+            <a:pPr marL="901700" indent="-342900">
+              <a:lnSpc>
+                <a:spcPct val="100000"/>
+              </a:lnSpc>
+              <a:spcAft>
+                <a:spcPts val="0"/>
+              </a:spcAft>
+              <a:buClr>
+                <a:schemeClr val="dk1"/>
+              </a:buClr>
+              <a:buFont typeface="Arial" panose="020B0604020202020204" pitchFamily="34" charset="0"/>
+              <a:buChar char="•"/>
+            </a:pPr>
+            <a:r>
+              <a:rPr lang="hu-HU" sz="2400" dirty="0" smtClean="0">
+                <a:solidFill>
+                  <a:srgbClr val="000000"/>
+                </a:solidFill>
+              </a:rPr>
+              <a:t>Ö</a:t>
+            </a:r>
+            <a:r>
+              <a:rPr lang="en" sz="2400" dirty="0" smtClean="0">
+                <a:solidFill>
+                  <a:srgbClr val="000000"/>
+                </a:solidFill>
+              </a:rPr>
+              <a:t>röklődés</a:t>
+            </a:r>
+            <a:r>
+              <a:rPr lang="hu-HU" sz="2400" dirty="0" smtClean="0">
+                <a:solidFill>
+                  <a:srgbClr val="000000"/>
+                </a:solidFill>
+              </a:rPr>
+              <a:t>:</a:t>
+            </a:r>
+          </a:p>
+          <a:p>
+            <a:pPr marL="1016000" lvl="3" indent="-457200">
+              <a:lnSpc>
+                <a:spcPct val="100000"/>
+              </a:lnSpc>
+              <a:spcAft>
+                <a:spcPts val="0"/>
+              </a:spcAft>
+              <a:buClr>
+                <a:schemeClr val="dk1"/>
+              </a:buClr>
+              <a:buFont typeface="+mj-lt"/>
+              <a:buAutoNum type="arabicPeriod"/>
+            </a:pPr>
+            <a:r>
+              <a:rPr lang="hu-HU" sz="2000" dirty="0" smtClean="0">
+                <a:solidFill>
+                  <a:srgbClr val="000000"/>
+                </a:solidFill>
+              </a:rPr>
+              <a:t> Öröklődés és</a:t>
+            </a:r>
+            <a:r>
+              <a:rPr lang="en" sz="2000" dirty="0" smtClean="0">
+                <a:solidFill>
+                  <a:srgbClr val="000000"/>
+                </a:solidFill>
+              </a:rPr>
+              <a:t> enkapszuláció</a:t>
+            </a:r>
+            <a:r>
+              <a:rPr lang="hu-HU" sz="2000" dirty="0" smtClean="0">
+                <a:solidFill>
+                  <a:srgbClr val="000000"/>
+                </a:solidFill>
+              </a:rPr>
+              <a:t> közötti különbség</a:t>
+            </a:r>
+            <a:endParaRPr lang="en" sz="2000" dirty="0">
+              <a:solidFill>
+                <a:srgbClr val="000000"/>
+              </a:solidFill>
+            </a:endParaRPr>
+          </a:p>
+          <a:p>
+            <a:pPr marL="1016000" lvl="3" indent="-457200">
+              <a:lnSpc>
+                <a:spcPct val="100000"/>
+              </a:lnSpc>
+              <a:spcAft>
+                <a:spcPts val="400"/>
+              </a:spcAft>
+              <a:buClr>
+                <a:srgbClr val="000000"/>
+              </a:buClr>
+              <a:buFont typeface="+mj-lt"/>
+              <a:buAutoNum type="arabicPeriod"/>
+            </a:pPr>
+            <a:r>
+              <a:rPr lang="hu-HU" sz="2000" dirty="0" smtClean="0">
+                <a:solidFill>
+                  <a:srgbClr val="000000"/>
+                </a:solidFill>
+              </a:rPr>
+              <a:t>Ő</a:t>
+            </a:r>
+            <a:r>
+              <a:rPr lang="en" sz="2000" dirty="0" smtClean="0">
+                <a:solidFill>
+                  <a:srgbClr val="000000"/>
+                </a:solidFill>
+              </a:rPr>
+              <a:t>sosztály</a:t>
+            </a:r>
+            <a:r>
+              <a:rPr lang="hu-HU" sz="2000" dirty="0" smtClean="0">
+                <a:solidFill>
+                  <a:srgbClr val="000000"/>
+                </a:solidFill>
+              </a:rPr>
+              <a:t>, az absztrakció célja</a:t>
+            </a:r>
+            <a:r>
+              <a:rPr lang="en" sz="2000" dirty="0" smtClean="0">
+                <a:solidFill>
+                  <a:srgbClr val="000000"/>
+                </a:solidFill>
+              </a:rPr>
+              <a:t>: </a:t>
+            </a:r>
+            <a:r>
+              <a:rPr lang="en" sz="2000" dirty="0">
+                <a:solidFill>
+                  <a:srgbClr val="000000"/>
+                </a:solidFill>
+              </a:rPr>
+              <a:t>közös tulajdonságok és viselkedés egy helyre mozgatása</a:t>
+            </a:r>
+          </a:p>
+          <a:p>
+            <a:pPr marL="1016000" lvl="3" indent="-457200">
+              <a:lnSpc>
+                <a:spcPct val="100000"/>
+              </a:lnSpc>
+              <a:spcAft>
+                <a:spcPts val="400"/>
+              </a:spcAft>
+              <a:buClr>
+                <a:srgbClr val="000000"/>
+              </a:buClr>
+              <a:buFont typeface="+mj-lt"/>
+              <a:buAutoNum type="arabicPeriod"/>
+            </a:pPr>
+            <a:r>
+              <a:rPr lang="en" sz="2000" dirty="0" smtClean="0">
+                <a:solidFill>
+                  <a:srgbClr val="000000"/>
+                </a:solidFill>
+              </a:rPr>
+              <a:t>diamond öröklődés</a:t>
+            </a:r>
+            <a:r>
+              <a:rPr lang="hu-HU" sz="2000" dirty="0" smtClean="0">
+                <a:solidFill>
+                  <a:srgbClr val="000000"/>
+                </a:solidFill>
+              </a:rPr>
+              <a:t> veszélyei</a:t>
+            </a:r>
+          </a:p>
+          <a:p>
+            <a:pPr marL="1016000" lvl="3" indent="-457200">
+              <a:lnSpc>
+                <a:spcPct val="100000"/>
+              </a:lnSpc>
+              <a:spcAft>
+                <a:spcPts val="400"/>
+              </a:spcAft>
+              <a:buClr>
+                <a:srgbClr val="000000"/>
+              </a:buClr>
+              <a:buFont typeface="+mj-lt"/>
+              <a:buAutoNum type="arabicPeriod"/>
+            </a:pPr>
+            <a:r>
+              <a:rPr lang="hu-HU" sz="2000" dirty="0" smtClean="0">
+                <a:solidFill>
+                  <a:srgbClr val="000000"/>
+                </a:solidFill>
+              </a:rPr>
+              <a:t>Absztrakt osztály (</a:t>
+            </a:r>
+            <a:r>
+              <a:rPr lang="hu-HU" sz="2000" dirty="0">
+                <a:solidFill>
+                  <a:srgbClr val="000000"/>
+                </a:solidFill>
+              </a:rPr>
+              <a:t>leszármaztatott osztály </a:t>
+            </a:r>
+            <a:r>
+              <a:rPr lang="hu-HU" sz="2000" dirty="0" smtClean="0">
+                <a:solidFill>
+                  <a:srgbClr val="000000"/>
+                </a:solidFill>
+              </a:rPr>
+              <a:t>extendálja)</a:t>
+            </a:r>
+            <a:endParaRPr lang="en" sz="2000" dirty="0">
+              <a:solidFill>
+                <a:srgbClr val="000000"/>
+              </a:solidFill>
+            </a:endParaRPr>
+          </a:p>
+          <a:p>
+            <a:pPr marL="1016000" lvl="3" indent="-457200">
+              <a:lnSpc>
+                <a:spcPct val="100000"/>
+              </a:lnSpc>
+              <a:spcAft>
+                <a:spcPts val="400"/>
+              </a:spcAft>
+              <a:buClr>
+                <a:srgbClr val="000000"/>
+              </a:buClr>
+              <a:buFont typeface="+mj-lt"/>
+              <a:buAutoNum type="arabicPeriod"/>
+            </a:pPr>
+            <a:r>
+              <a:rPr lang="hu-HU" sz="2000" dirty="0" smtClean="0">
+                <a:solidFill>
+                  <a:srgbClr val="000000"/>
+                </a:solidFill>
+              </a:rPr>
+              <a:t>Interfész osztály (egy osztály implementálhat többet is)</a:t>
+            </a:r>
+            <a:endParaRPr lang="en" sz="2000" dirty="0">
+              <a:solidFill>
+                <a:srgbClr val="000000"/>
+              </a:solidFill>
+            </a:endParaRPr>
+          </a:p>
+          <a:p>
+            <a:endParaRPr lang="hu-HU" dirty="0"/>
+          </a:p>
+        </p:txBody>
+      </p:sp>
+    </p:spTree>
+    <p:extLst>
+      <p:ext uri="{BB962C8B-B14F-4D97-AF65-F5344CB8AC3E}">
+        <p14:creationId xmlns="" xmlns:p14="http://schemas.microsoft.com/office/powerpoint/2010/main" val="1710381542"/>
+      </p:ext>
+    </p:extLst>
+  </p:cSld>
+  <p:clrMapOvr>
+    <a:masterClrMapping/>
+  </p:clrMapOvr>
+</p:sld>
+</file>
+
+<file path=ppt/slides/slide14.xml><?xml version="1.0" encoding="utf-8"?>
+<p:sld xmlns:a="http://schemas.openxmlformats.org/drawingml/2006/main" xmlns:r="http://schemas.openxmlformats.org/officeDocument/2006/relationships" xmlns:p="http://schemas.openxmlformats.org/presentationml/2006/main">
+  <p:cSld>
+    <p:spTree>
+      <p:nvGrpSpPr>
+        <p:cNvPr id="1" name="Shape 72"/>
+        <p:cNvGrpSpPr/>
+        <p:nvPr/>
+      </p:nvGrpSpPr>
+      <p:grpSpPr>
+        <a:xfrm>
+          <a:off x="0" y="0"/>
+          <a:ext cx="0" cy="0"/>
+          <a:chOff x="0" y="0"/>
+          <a:chExt cx="0" cy="0"/>
+        </a:xfrm>
+      </p:grpSpPr>
+      <p:sp>
+        <p:nvSpPr>
+          <p:cNvPr id="73" name="Shape 73"/>
+          <p:cNvSpPr txBox="1">
+            <a:spLocks noGrp="1"/>
+          </p:cNvSpPr>
+          <p:nvPr>
+            <p:ph type="title"/>
+          </p:nvPr>
+        </p:nvSpPr>
+        <p:spPr>
+          <a:xfrm>
+            <a:off x="311700" y="0"/>
+            <a:ext cx="8520599" cy="572699"/>
+          </a:xfrm>
+          <a:prstGeom prst="rect">
+            <a:avLst/>
+          </a:prstGeom>
+        </p:spPr>
+        <p:txBody>
+          <a:bodyPr lIns="91425" tIns="91425" rIns="91425" bIns="91425" anchor="t" anchorCtr="0">
+            <a:noAutofit/>
+          </a:bodyPr>
+          <a:lstStyle/>
+          <a:p>
+            <a:pPr lvl="0" algn="ctr">
+              <a:spcBef>
+                <a:spcPts val="0"/>
+              </a:spcBef>
+              <a:buNone/>
+            </a:pPr>
+            <a:r>
+              <a:rPr lang="en"/>
+              <a:t>Globális vonatkozású tanácsok</a:t>
+            </a:r>
+          </a:p>
+        </p:txBody>
+      </p:sp>
+      <p:sp>
+        <p:nvSpPr>
+          <p:cNvPr id="74" name="Shape 74"/>
+          <p:cNvSpPr txBox="1">
+            <a:spLocks noGrp="1"/>
+          </p:cNvSpPr>
+          <p:nvPr>
+            <p:ph type="body" idx="1"/>
+          </p:nvPr>
+        </p:nvSpPr>
+        <p:spPr>
+          <a:xfrm>
+            <a:off x="0" y="473075"/>
+            <a:ext cx="9144000" cy="4670400"/>
+          </a:xfrm>
+          <a:prstGeom prst="rect">
+            <a:avLst/>
+          </a:prstGeom>
+        </p:spPr>
+        <p:txBody>
+          <a:bodyPr lIns="91425" tIns="91425" rIns="91425" bIns="91425" anchor="ctr" anchorCtr="0">
+            <a:noAutofit/>
+          </a:bodyPr>
+          <a:lstStyle/>
+          <a:p>
+            <a:pPr marL="457200" lvl="0" indent="-381000" rtl="0">
+              <a:lnSpc>
+                <a:spcPct val="100000"/>
+              </a:lnSpc>
+              <a:spcBef>
+                <a:spcPts val="0"/>
+              </a:spcBef>
+              <a:spcAft>
+                <a:spcPts val="0"/>
+              </a:spcAft>
+              <a:buClr>
+                <a:schemeClr val="dk1"/>
+              </a:buClr>
+              <a:buSzPct val="100000"/>
+              <a:buFont typeface="Arial" panose="020B0604020202020204" pitchFamily="34" charset="0"/>
+              <a:buChar char="•"/>
+            </a:pPr>
+            <a:r>
+              <a:rPr lang="hu-HU" sz="2400" dirty="0" smtClean="0">
+                <a:solidFill>
+                  <a:schemeClr val="dk1"/>
+                </a:solidFill>
+              </a:rPr>
+              <a:t>E</a:t>
+            </a:r>
+            <a:r>
+              <a:rPr lang="en" sz="2400" dirty="0" smtClean="0">
+                <a:solidFill>
+                  <a:schemeClr val="dk1"/>
+                </a:solidFill>
+              </a:rPr>
+              <a:t>gy </a:t>
+            </a:r>
+            <a:r>
+              <a:rPr lang="en" sz="2400" dirty="0">
+                <a:solidFill>
+                  <a:schemeClr val="dk1"/>
+                </a:solidFill>
+              </a:rPr>
+              <a:t>probléma amibe belefutunk, valószínű más is belefutott már: leggyorsabb,legbiztosabb megoldás a neten utánakeresés</a:t>
+            </a:r>
+          </a:p>
+          <a:p>
+            <a:pPr marL="457200" lvl="0" indent="-381000" rtl="0">
+              <a:lnSpc>
+                <a:spcPct val="100000"/>
+              </a:lnSpc>
+              <a:spcBef>
+                <a:spcPts val="0"/>
+              </a:spcBef>
+              <a:spcAft>
+                <a:spcPts val="0"/>
+              </a:spcAft>
+              <a:buClr>
+                <a:schemeClr val="dk1"/>
+              </a:buClr>
+              <a:buSzPct val="100000"/>
+              <a:buFont typeface="Arial" panose="020B0604020202020204" pitchFamily="34" charset="0"/>
+              <a:buChar char="•"/>
+            </a:pPr>
+            <a:r>
+              <a:rPr lang="en" sz="2400" dirty="0">
+                <a:solidFill>
+                  <a:schemeClr val="dk1"/>
+                </a:solidFill>
+              </a:rPr>
+              <a:t>For ciklus helyett foreach vagy </a:t>
+            </a:r>
+            <a:r>
+              <a:rPr lang="en" sz="2400" dirty="0" smtClean="0">
+                <a:solidFill>
+                  <a:schemeClr val="dk1"/>
+                </a:solidFill>
+              </a:rPr>
+              <a:t>stream</a:t>
+            </a:r>
+            <a:r>
+              <a:rPr lang="hu-HU" sz="2400" dirty="0" smtClean="0">
+                <a:solidFill>
+                  <a:schemeClr val="dk1"/>
+                </a:solidFill>
+              </a:rPr>
+              <a:t> (Iterable interface megvalósítása miatt lehet)</a:t>
+            </a:r>
+            <a:endParaRPr lang="en" sz="2400" dirty="0">
+              <a:solidFill>
+                <a:schemeClr val="dk1"/>
+              </a:solidFill>
+            </a:endParaRPr>
+          </a:p>
+          <a:p>
+            <a:pPr marL="457200" lvl="0" indent="-381000" rtl="0">
+              <a:lnSpc>
+                <a:spcPct val="100000"/>
+              </a:lnSpc>
+              <a:spcBef>
+                <a:spcPts val="0"/>
+              </a:spcBef>
+              <a:spcAft>
+                <a:spcPts val="0"/>
+              </a:spcAft>
+              <a:buClr>
+                <a:schemeClr val="dk1"/>
+              </a:buClr>
+              <a:buSzPct val="100000"/>
+              <a:buFont typeface="Arial" panose="020B0604020202020204" pitchFamily="34" charset="0"/>
+              <a:buChar char="•"/>
+            </a:pPr>
+            <a:r>
+              <a:rPr lang="en" sz="2400" dirty="0" smtClean="0">
+                <a:solidFill>
+                  <a:schemeClr val="dk1"/>
+                </a:solidFill>
+              </a:rPr>
+              <a:t>Autoboxing</a:t>
+            </a:r>
+            <a:r>
+              <a:rPr lang="hu-HU" sz="2400" dirty="0" smtClean="0">
+                <a:solidFill>
+                  <a:schemeClr val="dk1"/>
+                </a:solidFill>
+              </a:rPr>
+              <a:t> és unboxing</a:t>
+            </a:r>
+            <a:endParaRPr lang="en" sz="2400" dirty="0">
+              <a:solidFill>
+                <a:schemeClr val="dk1"/>
+              </a:solidFill>
+            </a:endParaRPr>
+          </a:p>
+          <a:p>
+            <a:pPr marL="457200" lvl="0" indent="-381000" rtl="0">
+              <a:lnSpc>
+                <a:spcPct val="100000"/>
+              </a:lnSpc>
+              <a:spcBef>
+                <a:spcPts val="0"/>
+              </a:spcBef>
+              <a:spcAft>
+                <a:spcPts val="0"/>
+              </a:spcAft>
+              <a:buClr>
+                <a:schemeClr val="dk1"/>
+              </a:buClr>
+              <a:buSzPct val="100000"/>
+              <a:buFont typeface="Arial" panose="020B0604020202020204" pitchFamily="34" charset="0"/>
+              <a:buChar char="•"/>
+            </a:pPr>
+            <a:r>
+              <a:rPr lang="en" sz="2400" dirty="0" smtClean="0">
+                <a:solidFill>
+                  <a:schemeClr val="dk1"/>
+                </a:solidFill>
+              </a:rPr>
+              <a:t>Egyenlőségek</a:t>
+            </a:r>
+            <a:r>
+              <a:rPr lang="hu-HU" sz="2400" dirty="0" smtClean="0">
+                <a:solidFill>
+                  <a:schemeClr val="dk1"/>
+                </a:solidFill>
+              </a:rPr>
+              <a:t>(érték illetve referencia alapján: == vs. </a:t>
+            </a:r>
+            <a:r>
+              <a:rPr lang="hu-HU" sz="2400" dirty="0">
+                <a:solidFill>
+                  <a:schemeClr val="dk1"/>
+                </a:solidFill>
+              </a:rPr>
+              <a:t>e</a:t>
+            </a:r>
+            <a:r>
+              <a:rPr lang="hu-HU" sz="2400" dirty="0" smtClean="0">
+                <a:solidFill>
+                  <a:schemeClr val="dk1"/>
+                </a:solidFill>
+              </a:rPr>
+              <a:t>quals)</a:t>
+            </a:r>
+            <a:endParaRPr lang="en" sz="2400" dirty="0">
+              <a:solidFill>
+                <a:schemeClr val="dk1"/>
+              </a:solidFill>
+            </a:endParaRPr>
+          </a:p>
+          <a:p>
+            <a:pPr marL="457200" lvl="0" indent="-381000" rtl="0">
+              <a:lnSpc>
+                <a:spcPct val="100000"/>
+              </a:lnSpc>
+              <a:spcBef>
+                <a:spcPts val="0"/>
+              </a:spcBef>
+              <a:spcAft>
+                <a:spcPts val="0"/>
+              </a:spcAft>
+              <a:buClr>
+                <a:schemeClr val="dk1"/>
+              </a:buClr>
+              <a:buSzPct val="100000"/>
+              <a:buFont typeface="Arial" panose="020B0604020202020204" pitchFamily="34" charset="0"/>
+              <a:buChar char="•"/>
+            </a:pPr>
+            <a:r>
+              <a:rPr lang="hu-HU" sz="2400" dirty="0" smtClean="0">
+                <a:solidFill>
+                  <a:schemeClr val="dk1"/>
+                </a:solidFill>
+              </a:rPr>
+              <a:t>A</a:t>
+            </a:r>
+            <a:r>
+              <a:rPr lang="en" sz="2400" dirty="0" smtClean="0">
+                <a:solidFill>
+                  <a:schemeClr val="dk1"/>
+                </a:solidFill>
+              </a:rPr>
+              <a:t>rray-&gt;</a:t>
+            </a:r>
+            <a:r>
+              <a:rPr lang="hu-HU" sz="2400" dirty="0" smtClean="0">
+                <a:solidFill>
+                  <a:schemeClr val="dk1"/>
+                </a:solidFill>
+              </a:rPr>
+              <a:t>raw ArrayList-&gt;</a:t>
+            </a:r>
+            <a:r>
+              <a:rPr lang="en" sz="2400" dirty="0" smtClean="0">
+                <a:solidFill>
+                  <a:schemeClr val="dk1"/>
+                </a:solidFill>
+              </a:rPr>
+              <a:t>generic </a:t>
+            </a:r>
+            <a:r>
+              <a:rPr lang="hu-HU" sz="2400" dirty="0" smtClean="0">
+                <a:solidFill>
+                  <a:schemeClr val="dk1"/>
+                </a:solidFill>
+              </a:rPr>
+              <a:t>ArrayL</a:t>
+            </a:r>
+            <a:r>
+              <a:rPr lang="en" sz="2400" dirty="0" smtClean="0">
+                <a:solidFill>
+                  <a:schemeClr val="dk1"/>
+                </a:solidFill>
+              </a:rPr>
+              <a:t>ist</a:t>
+            </a:r>
+            <a:r>
+              <a:rPr lang="hu-HU" sz="2400" smtClean="0">
+                <a:solidFill>
+                  <a:schemeClr val="dk1"/>
+                </a:solidFill>
+              </a:rPr>
+              <a:t>&lt;&gt; </a:t>
+            </a:r>
+            <a:r>
+              <a:rPr lang="en" sz="2400" smtClean="0">
+                <a:solidFill>
+                  <a:schemeClr val="dk1"/>
+                </a:solidFill>
+              </a:rPr>
+              <a:t>-&gt;</a:t>
+            </a:r>
+            <a:r>
+              <a:rPr lang="hu-HU" sz="2400" dirty="0" smtClean="0">
+                <a:solidFill>
+                  <a:schemeClr val="dk1"/>
+                </a:solidFill>
+              </a:rPr>
+              <a:t>H</a:t>
+            </a:r>
+            <a:r>
+              <a:rPr lang="en" sz="2400" dirty="0" smtClean="0">
+                <a:solidFill>
+                  <a:schemeClr val="dk1"/>
+                </a:solidFill>
+              </a:rPr>
+              <a:t>ash</a:t>
+            </a:r>
+            <a:r>
+              <a:rPr lang="hu-HU" sz="2400" dirty="0" smtClean="0">
+                <a:solidFill>
+                  <a:schemeClr val="dk1"/>
+                </a:solidFill>
+              </a:rPr>
+              <a:t>S</a:t>
+            </a:r>
+            <a:r>
+              <a:rPr lang="en" sz="2400" dirty="0" smtClean="0">
+                <a:solidFill>
+                  <a:schemeClr val="dk1"/>
+                </a:solidFill>
+              </a:rPr>
+              <a:t>et</a:t>
+            </a:r>
+            <a:endParaRPr lang="hu-HU" sz="2400" dirty="0" smtClean="0">
+              <a:solidFill>
+                <a:schemeClr val="dk1"/>
+              </a:solidFill>
+            </a:endParaRPr>
+          </a:p>
+        </p:txBody>
+      </p:sp>
+    </p:spTree>
+  </p:cSld>
+  <p:clrMapOvr>
+    <a:masterClrMapping/>
+  </p:clrMapOvr>
+  <p:transition spd="slow">
+    <p:cut/>
+  </p:transition>
+</p:sld>
+</file>
+
+<file path=ppt/slides/slide15.xml><?xml version="1.0" encoding="utf-8"?>
+<p:sld xmlns:a="http://schemas.openxmlformats.org/drawingml/2006/main" xmlns:r="http://schemas.openxmlformats.org/officeDocument/2006/relationships" xmlns:p="http://schemas.openxmlformats.org/presentationml/2006/main">
+  <p:cSld>
+    <p:spTree>
+      <p:nvGrpSpPr>
         <p:cNvPr id="1" name="Shape 137"/>
         <p:cNvGrpSpPr/>
         <p:nvPr/>
@@ -6257,7 +7835,7 @@
 </p:sld>
 </file>
 
-<file path=ppt/slides/slide13.xml><?xml version="1.0" encoding="utf-8"?>
+<file path=ppt/slides/slide16.xml><?xml version="1.0" encoding="utf-8"?>
 <p:sld xmlns:a="http://schemas.openxmlformats.org/drawingml/2006/main" xmlns:r="http://schemas.openxmlformats.org/officeDocument/2006/relationships" xmlns:p="http://schemas.openxmlformats.org/presentationml/2006/main">
   <p:cSld>
     <p:spTree>
@@ -6554,7 +8132,7 @@
 </p:sld>
 </file>
 
-<file path=ppt/slides/slide14.xml><?xml version="1.0" encoding="utf-8"?>
+<file path=ppt/slides/slide17.xml><?xml version="1.0" encoding="utf-8"?>
 <p:sld xmlns:a="http://schemas.openxmlformats.org/drawingml/2006/main" xmlns:r="http://schemas.openxmlformats.org/officeDocument/2006/relationships" xmlns:p="http://schemas.openxmlformats.org/presentationml/2006/main">
   <p:cSld>
     <p:spTree>
@@ -7098,7 +8676,7 @@
 </p:sld>
 </file>
 
-<file path=ppt/slides/slide15.xml><?xml version="1.0" encoding="utf-8"?>
+<file path=ppt/slides/slide18.xml><?xml version="1.0" encoding="utf-8"?>
 <p:sld xmlns:a="http://schemas.openxmlformats.org/drawingml/2006/main" xmlns:r="http://schemas.openxmlformats.org/officeDocument/2006/relationships" xmlns:p="http://schemas.openxmlformats.org/presentationml/2006/main">
   <p:cSld>
     <p:spTree>
@@ -7164,7 +8742,7 @@
 </p:sld>
 </file>
 
-<file path=ppt/slides/slide16.xml><?xml version="1.0" encoding="utf-8"?>
+<file path=ppt/slides/slide19.xml><?xml version="1.0" encoding="utf-8"?>
 <p:sld xmlns:a="http://schemas.openxmlformats.org/drawingml/2006/main" xmlns:r="http://schemas.openxmlformats.org/officeDocument/2006/relationships" xmlns:p="http://schemas.openxmlformats.org/presentationml/2006/main">
   <p:cSld>
     <p:spTree>
@@ -7213,30 +8791,18 @@
               <a:buNone/>
             </a:pPr>
             <a:r>
-              <a:rPr lang="en"/>
-              <a:t>Köszönjük a figyelmet!</a:t>
-            </a:r>
-          </a:p>
-          <a:p>
-            <a:pPr lvl="0" rtl="0">
-              <a:spcBef>
-                <a:spcPts val="0"/>
-              </a:spcBef>
-              <a:buNone/>
-            </a:pPr>
-            <a:endParaRPr/>
-          </a:p>
-          <a:p>
-            <a:pPr lvl="0">
-              <a:spcBef>
-                <a:spcPts val="0"/>
-              </a:spcBef>
-              <a:buNone/>
-            </a:pPr>
-            <a:r>
-              <a:rPr lang="en"/>
-              <a:t>Záporozhatnak a kérdések!</a:t>
-            </a:r>
+              <a:rPr lang="en" dirty="0"/>
+              <a:t>Köszönjük a </a:t>
+            </a:r>
+            <a:r>
+              <a:rPr lang="en" dirty="0" smtClean="0"/>
+              <a:t>figyelmet</a:t>
+            </a:r>
+            <a:r>
+              <a:rPr lang="hu-HU" smtClean="0"/>
+              <a:t>!</a:t>
+            </a:r>
+            <a:endParaRPr lang="en" dirty="0"/>
           </a:p>
         </p:txBody>
       </p:sp>

</xml_diff>